<commit_message>
adds xml lecture pdf
</commit_message>
<xml_diff>
--- a/Lectures/2023-07-14-xml_nfm.pptx
+++ b/Lectures/2023-07-14-xml_nfm.pptx
@@ -203,7 +203,7 @@
           <a:p>
             <a:fld id="{559B813C-1505-AF42-8F33-B63B902FA698}" type="datetimeFigureOut">
               <a:rPr lang="en-US" smtClean="0"/>
-              <a:t>7/10/23</a:t>
+              <a:t>7/26/24</a:t>
             </a:fld>
             <a:endParaRPr lang="en-US"/>
           </a:p>
@@ -953,7 +953,7 @@
           <a:p>
             <a:fld id="{65C2829D-0F3A-D541-ADF3-F6FC21265909}" type="datetimeFigureOut">
               <a:rPr lang="en-US" smtClean="0"/>
-              <a:t>7/10/23</a:t>
+              <a:t>7/26/24</a:t>
             </a:fld>
             <a:endParaRPr lang="en-US"/>
           </a:p>
@@ -1151,7 +1151,7 @@
           <a:p>
             <a:fld id="{65C2829D-0F3A-D541-ADF3-F6FC21265909}" type="datetimeFigureOut">
               <a:rPr lang="en-US" smtClean="0"/>
-              <a:t>7/10/23</a:t>
+              <a:t>7/26/24</a:t>
             </a:fld>
             <a:endParaRPr lang="en-US"/>
           </a:p>
@@ -1359,7 +1359,7 @@
           <a:p>
             <a:fld id="{65C2829D-0F3A-D541-ADF3-F6FC21265909}" type="datetimeFigureOut">
               <a:rPr lang="en-US" smtClean="0"/>
-              <a:t>7/10/23</a:t>
+              <a:t>7/26/24</a:t>
             </a:fld>
             <a:endParaRPr lang="en-US"/>
           </a:p>
@@ -1557,7 +1557,7 @@
           <a:p>
             <a:fld id="{65C2829D-0F3A-D541-ADF3-F6FC21265909}" type="datetimeFigureOut">
               <a:rPr lang="en-US" smtClean="0"/>
-              <a:t>7/10/23</a:t>
+              <a:t>7/26/24</a:t>
             </a:fld>
             <a:endParaRPr lang="en-US"/>
           </a:p>
@@ -1832,7 +1832,7 @@
           <a:p>
             <a:fld id="{65C2829D-0F3A-D541-ADF3-F6FC21265909}" type="datetimeFigureOut">
               <a:rPr lang="en-US" smtClean="0"/>
-              <a:t>7/10/23</a:t>
+              <a:t>7/26/24</a:t>
             </a:fld>
             <a:endParaRPr lang="en-US"/>
           </a:p>
@@ -2097,7 +2097,7 @@
           <a:p>
             <a:fld id="{65C2829D-0F3A-D541-ADF3-F6FC21265909}" type="datetimeFigureOut">
               <a:rPr lang="en-US" smtClean="0"/>
-              <a:t>7/10/23</a:t>
+              <a:t>7/26/24</a:t>
             </a:fld>
             <a:endParaRPr lang="en-US"/>
           </a:p>
@@ -2509,7 +2509,7 @@
           <a:p>
             <a:fld id="{65C2829D-0F3A-D541-ADF3-F6FC21265909}" type="datetimeFigureOut">
               <a:rPr lang="en-US" smtClean="0"/>
-              <a:t>7/10/23</a:t>
+              <a:t>7/26/24</a:t>
             </a:fld>
             <a:endParaRPr lang="en-US"/>
           </a:p>
@@ -2650,7 +2650,7 @@
           <a:p>
             <a:fld id="{65C2829D-0F3A-D541-ADF3-F6FC21265909}" type="datetimeFigureOut">
               <a:rPr lang="en-US" smtClean="0"/>
-              <a:t>7/10/23</a:t>
+              <a:t>7/26/24</a:t>
             </a:fld>
             <a:endParaRPr lang="en-US"/>
           </a:p>
@@ -2763,7 +2763,7 @@
           <a:p>
             <a:fld id="{65C2829D-0F3A-D541-ADF3-F6FC21265909}" type="datetimeFigureOut">
               <a:rPr lang="en-US" smtClean="0"/>
-              <a:t>7/10/23</a:t>
+              <a:t>7/26/24</a:t>
             </a:fld>
             <a:endParaRPr lang="en-US"/>
           </a:p>
@@ -3074,7 +3074,7 @@
           <a:p>
             <a:fld id="{65C2829D-0F3A-D541-ADF3-F6FC21265909}" type="datetimeFigureOut">
               <a:rPr lang="en-US" smtClean="0"/>
-              <a:t>7/10/23</a:t>
+              <a:t>7/26/24</a:t>
             </a:fld>
             <a:endParaRPr lang="en-US"/>
           </a:p>
@@ -3362,7 +3362,7 @@
           <a:p>
             <a:fld id="{65C2829D-0F3A-D541-ADF3-F6FC21265909}" type="datetimeFigureOut">
               <a:rPr lang="en-US" smtClean="0"/>
-              <a:t>7/10/23</a:t>
+              <a:t>7/26/24</a:t>
             </a:fld>
             <a:endParaRPr lang="en-US"/>
           </a:p>
@@ -3603,7 +3603,7 @@
           <a:p>
             <a:fld id="{65C2829D-0F3A-D541-ADF3-F6FC21265909}" type="datetimeFigureOut">
               <a:rPr lang="en-US" smtClean="0"/>
-              <a:t>7/10/23</a:t>
+              <a:t>7/26/24</a:t>
             </a:fld>
             <a:endParaRPr lang="en-US"/>
           </a:p>
@@ -4483,44 +4483,27 @@
           <a:p>
             <a:r>
               <a:rPr lang="en-US" sz="1600" dirty="0"/>
-              <a:t>e-mail: nicola.felix.mueller@gmail.com</a:t>
-            </a:r>
-          </a:p>
-          <a:p>
+              <a:t>e-mail: </a:t>
+            </a:r>
+            <a:r>
+              <a:rPr lang="en-US" sz="1600" dirty="0" err="1"/>
+              <a:t>Nicola.</a:t>
+            </a:r>
+            <a:r>
+              <a:rPr lang="en-US" sz="1600" err="1"/>
+              <a:t>mueller</a:t>
+            </a:r>
+            <a:r>
+              <a:rPr lang="en-US" sz="1600"/>
+              <a:t>@ucsf.edu</a:t>
+            </a:r>
             <a:endParaRPr lang="en-US" sz="1600" dirty="0"/>
           </a:p>
-        </p:txBody>
-      </p:sp>
-      <p:pic>
-        <p:nvPicPr>
-          <p:cNvPr id="6" name="Picture 5" descr="A picture containing text, font, logo, circle&#10;&#10;Description automatically generated">
-            <a:extLst>
-              <a:ext uri="{FF2B5EF4-FFF2-40B4-BE49-F238E27FC236}">
-                <a16:creationId xmlns:a16="http://schemas.microsoft.com/office/drawing/2014/main" id="{876B89B1-33A0-4B9B-ACB3-06F24FBF4D44}"/>
-              </a:ext>
-            </a:extLst>
-          </p:cNvPr>
-          <p:cNvPicPr>
-            <a:picLocks noChangeAspect="1"/>
-          </p:cNvPicPr>
-          <p:nvPr/>
-        </p:nvPicPr>
-        <p:blipFill>
-          <a:blip r:embed="rId2"/>
-          <a:stretch>
-            <a:fillRect/>
-          </a:stretch>
-        </p:blipFill>
-        <p:spPr>
-          <a:xfrm>
-            <a:off x="5081953" y="4848685"/>
-            <a:ext cx="2028093" cy="2009315"/>
-          </a:xfrm>
-          <a:prstGeom prst="rect">
-            <a:avLst/>
-          </a:prstGeom>
-        </p:spPr>
-      </p:pic>
+          <a:p>
+            <a:endParaRPr lang="en-US" sz="1600" dirty="0"/>
+          </a:p>
+        </p:txBody>
+      </p:sp>
     </p:spTree>
     <p:extLst>
       <p:ext uri="{BB962C8B-B14F-4D97-AF65-F5344CB8AC3E}">

</xml_diff>